<commit_message>
Made changes in ppt and project report
</commit_message>
<xml_diff>
--- a/6th Sem/Poster.pptx
+++ b/6th Sem/Poster.pptx
@@ -223,7 +223,7 @@
           <a:p>
             <a:fld id="{87BDEA32-7425-47D2-82E0-90A00B2E8818}" type="datetimeFigureOut">
               <a:rPr lang="en-IN" smtClean="0"/>
-              <a:t>01-05-2020</a:t>
+              <a:t>18-05-2020</a:t>
             </a:fld>
             <a:endParaRPr lang="en-IN"/>
           </a:p>
@@ -467,7 +467,7 @@
           <a:p>
             <a:fld id="{3C7D744B-3DE5-4843-8D63-E92762F5EEA0}" type="datetimeFigureOut">
               <a:rPr lang="en-IN" smtClean="0"/>
-              <a:t>01-05-2020</a:t>
+              <a:t>18-05-2020</a:t>
             </a:fld>
             <a:endParaRPr lang="en-IN"/>
           </a:p>
@@ -667,7 +667,7 @@
           <a:p>
             <a:fld id="{3C7D744B-3DE5-4843-8D63-E92762F5EEA0}" type="datetimeFigureOut">
               <a:rPr lang="en-IN" smtClean="0"/>
-              <a:t>01-05-2020</a:t>
+              <a:t>18-05-2020</a:t>
             </a:fld>
             <a:endParaRPr lang="en-IN"/>
           </a:p>
@@ -877,7 +877,7 @@
           <a:p>
             <a:fld id="{3C7D744B-3DE5-4843-8D63-E92762F5EEA0}" type="datetimeFigureOut">
               <a:rPr lang="en-IN" smtClean="0"/>
-              <a:t>01-05-2020</a:t>
+              <a:t>18-05-2020</a:t>
             </a:fld>
             <a:endParaRPr lang="en-IN"/>
           </a:p>
@@ -2067,7 +2067,7 @@
           <a:p>
             <a:fld id="{3C7D744B-3DE5-4843-8D63-E92762F5EEA0}" type="datetimeFigureOut">
               <a:rPr lang="en-IN" smtClean="0"/>
-              <a:t>01-05-2020</a:t>
+              <a:t>18-05-2020</a:t>
             </a:fld>
             <a:endParaRPr lang="en-IN"/>
           </a:p>
@@ -2343,7 +2343,7 @@
           <a:p>
             <a:fld id="{3C7D744B-3DE5-4843-8D63-E92762F5EEA0}" type="datetimeFigureOut">
               <a:rPr lang="en-IN" smtClean="0"/>
-              <a:t>01-05-2020</a:t>
+              <a:t>18-05-2020</a:t>
             </a:fld>
             <a:endParaRPr lang="en-IN"/>
           </a:p>
@@ -2611,7 +2611,7 @@
           <a:p>
             <a:fld id="{3C7D744B-3DE5-4843-8D63-E92762F5EEA0}" type="datetimeFigureOut">
               <a:rPr lang="en-IN" smtClean="0"/>
-              <a:t>01-05-2020</a:t>
+              <a:t>18-05-2020</a:t>
             </a:fld>
             <a:endParaRPr lang="en-IN"/>
           </a:p>
@@ -3026,7 +3026,7 @@
           <a:p>
             <a:fld id="{3C7D744B-3DE5-4843-8D63-E92762F5EEA0}" type="datetimeFigureOut">
               <a:rPr lang="en-IN" smtClean="0"/>
-              <a:t>01-05-2020</a:t>
+              <a:t>18-05-2020</a:t>
             </a:fld>
             <a:endParaRPr lang="en-IN"/>
           </a:p>
@@ -3168,7 +3168,7 @@
           <a:p>
             <a:fld id="{3C7D744B-3DE5-4843-8D63-E92762F5EEA0}" type="datetimeFigureOut">
               <a:rPr lang="en-IN" smtClean="0"/>
-              <a:t>01-05-2020</a:t>
+              <a:t>18-05-2020</a:t>
             </a:fld>
             <a:endParaRPr lang="en-IN"/>
           </a:p>
@@ -3281,7 +3281,7 @@
           <a:p>
             <a:fld id="{3C7D744B-3DE5-4843-8D63-E92762F5EEA0}" type="datetimeFigureOut">
               <a:rPr lang="en-IN" smtClean="0"/>
-              <a:t>01-05-2020</a:t>
+              <a:t>18-05-2020</a:t>
             </a:fld>
             <a:endParaRPr lang="en-IN"/>
           </a:p>
@@ -3594,7 +3594,7 @@
           <a:p>
             <a:fld id="{3C7D744B-3DE5-4843-8D63-E92762F5EEA0}" type="datetimeFigureOut">
               <a:rPr lang="en-IN" smtClean="0"/>
-              <a:t>01-05-2020</a:t>
+              <a:t>18-05-2020</a:t>
             </a:fld>
             <a:endParaRPr lang="en-IN"/>
           </a:p>
@@ -3883,7 +3883,7 @@
           <a:p>
             <a:fld id="{3C7D744B-3DE5-4843-8D63-E92762F5EEA0}" type="datetimeFigureOut">
               <a:rPr lang="en-IN" smtClean="0"/>
-              <a:t>01-05-2020</a:t>
+              <a:t>18-05-2020</a:t>
             </a:fld>
             <a:endParaRPr lang="en-IN"/>
           </a:p>
@@ -4126,7 +4126,7 @@
           <a:p>
             <a:fld id="{3C7D744B-3DE5-4843-8D63-E92762F5EEA0}" type="datetimeFigureOut">
               <a:rPr lang="en-IN" smtClean="0"/>
-              <a:t>01-05-2020</a:t>
+              <a:t>18-05-2020</a:t>
             </a:fld>
             <a:endParaRPr lang="en-IN"/>
           </a:p>
@@ -4633,14 +4633,7 @@
                 <a:latin typeface="Times New Roman" panose="02020603050405020304" pitchFamily="18" charset="0"/>
                 <a:cs typeface="Times New Roman" panose="02020603050405020304" pitchFamily="18" charset="0"/>
               </a:rPr>
-              <a:t>                                                       </a:t>
-            </a:r>
-            <a:r>
-              <a:rPr lang="en-US" sz="1800" smtClean="0">
-                <a:latin typeface="Times New Roman" panose="02020603050405020304" pitchFamily="18" charset="0"/>
-                <a:cs typeface="Times New Roman" panose="02020603050405020304" pitchFamily="18" charset="0"/>
-              </a:rPr>
-              <a:t>Chairperson</a:t>
+              <a:t>                                                       Chairperson</a:t>
             </a:r>
             <a:r>
               <a:rPr lang="en-US" sz="1800" dirty="0" smtClean="0">
@@ -4933,6 +4926,10 @@
           </p:nvPr>
         </p:nvSpPr>
         <p:spPr>
+          <a:xfrm>
+            <a:off x="8220892" y="4828530"/>
+            <a:ext cx="3773714" cy="222250"/>
+          </a:xfrm>
           <a:solidFill>
             <a:schemeClr val="accent5"/>
           </a:solidFill>
@@ -4969,8 +4966,8 @@
         </p:nvSpPr>
         <p:spPr>
           <a:xfrm>
-            <a:off x="193524" y="5143499"/>
-            <a:ext cx="3773714" cy="1714501"/>
+            <a:off x="8220892" y="5030096"/>
+            <a:ext cx="3773714" cy="1762590"/>
           </a:xfrm>
         </p:spPr>
         <p:txBody>
@@ -5077,7 +5074,12 @@
             <p:ph type="body" sz="quarter" idx="17"/>
           </p:nvPr>
         </p:nvSpPr>
-        <p:spPr/>
+        <p:spPr>
+          <a:xfrm>
+            <a:off x="8128002" y="3210545"/>
+            <a:ext cx="3773714" cy="1599580"/>
+          </a:xfrm>
+        </p:spPr>
         <p:txBody>
           <a:bodyPr>
             <a:noAutofit/>
@@ -5122,8 +5124,19 @@
                 <a:latin typeface="Times New Roman" panose="02020603050405020304" pitchFamily="18" charset="0"/>
                 <a:cs typeface="Times New Roman" panose="02020603050405020304" pitchFamily="18" charset="0"/>
               </a:rPr>
-              <a:t>A Mobile Application can be developed that will make the user more convenient to use.</a:t>
-            </a:r>
+              <a:t>A Mobile Application can be developed </a:t>
+            </a:r>
+            <a:r>
+              <a:rPr lang="en-IN" sz="1100" dirty="0" smtClean="0">
+                <a:latin typeface="Times New Roman" panose="02020603050405020304" pitchFamily="18" charset="0"/>
+                <a:cs typeface="Times New Roman" panose="02020603050405020304" pitchFamily="18" charset="0"/>
+              </a:rPr>
+              <a:t>that will make the user more convenient to use.</a:t>
+            </a:r>
+            <a:endParaRPr lang="en-IN" sz="1100" dirty="0">
+              <a:latin typeface="Times New Roman" panose="02020603050405020304" pitchFamily="18" charset="0"/>
+              <a:cs typeface="Times New Roman" panose="02020603050405020304" pitchFamily="18" charset="0"/>
+            </a:endParaRPr>
           </a:p>
           <a:p>
             <a:pPr>
@@ -5176,8 +5189,12 @@
                 <a:latin typeface="Times New Roman" panose="02020603050405020304" pitchFamily="18" charset="0"/>
                 <a:cs typeface="Times New Roman" panose="02020603050405020304" pitchFamily="18" charset="0"/>
               </a:rPr>
-              <a:t>Methods</a:t>
-            </a:r>
+              <a:t>Methodology</a:t>
+            </a:r>
+            <a:endParaRPr lang="en-US" sz="1200" dirty="0" smtClean="0">
+              <a:latin typeface="Times New Roman" panose="02020603050405020304" pitchFamily="18" charset="0"/>
+              <a:cs typeface="Times New Roman" panose="02020603050405020304" pitchFamily="18" charset="0"/>
+            </a:endParaRPr>
           </a:p>
         </p:txBody>
       </p:sp>
@@ -5197,8 +5214,8 @@
         </p:blipFill>
         <p:spPr>
           <a:xfrm>
-            <a:off x="8228633" y="1111250"/>
-            <a:ext cx="3769843" cy="3746501"/>
+            <a:off x="4211079" y="3884023"/>
+            <a:ext cx="3769843" cy="2908664"/>
           </a:xfrm>
           <a:prstGeom prst="rect">
             <a:avLst/>
@@ -5216,6 +5233,10 @@
           </p:nvPr>
         </p:nvSpPr>
         <p:spPr>
+          <a:xfrm>
+            <a:off x="8128002" y="2969890"/>
+            <a:ext cx="3773714" cy="222250"/>
+          </a:xfrm>
           <a:solidFill>
             <a:schemeClr val="accent5"/>
           </a:solidFill>
@@ -5292,12 +5313,12 @@
       </p:pic>
       <p:pic>
         <p:nvPicPr>
-          <p:cNvPr id="9" name="Chart Placeholder 8"/>
+          <p:cNvPr id="12" name="Chart Placeholder 11"/>
           <p:cNvPicPr>
             <a:picLocks noGrp="1" noChangeAspect="1"/>
           </p:cNvPicPr>
           <p:nvPr>
-            <p:ph type="chart" sz="quarter" idx="24"/>
+            <p:ph type="chart" sz="quarter" idx="25"/>
           </p:nvPr>
         </p:nvPicPr>
         <p:blipFill>
@@ -5308,8 +5329,8 @@
         </p:blipFill>
         <p:spPr>
           <a:xfrm>
-            <a:off x="4209143" y="1237570"/>
-            <a:ext cx="3773714" cy="2413180"/>
+            <a:off x="4209143" y="1111250"/>
+            <a:ext cx="3771780" cy="2520224"/>
           </a:xfrm>
           <a:prstGeom prst="rect">
             <a:avLst/>
@@ -5318,13 +5339,11 @@
       </p:pic>
       <p:pic>
         <p:nvPicPr>
-          <p:cNvPr id="12" name="Chart Placeholder 11"/>
+          <p:cNvPr id="5" name="Picture 4"/>
           <p:cNvPicPr>
-            <a:picLocks noGrp="1" noChangeAspect="1"/>
+            <a:picLocks noChangeAspect="1"/>
           </p:cNvPicPr>
-          <p:nvPr>
-            <p:ph type="chart" sz="quarter" idx="25"/>
-          </p:nvPr>
+          <p:nvPr/>
         </p:nvPicPr>
         <p:blipFill>
           <a:blip r:embed="rId7"/>
@@ -5334,14 +5353,116 @@
         </p:blipFill>
         <p:spPr>
           <a:xfrm>
-            <a:off x="4209142" y="3777070"/>
-            <a:ext cx="3773715" cy="2859859"/>
+            <a:off x="8224762" y="1144265"/>
+            <a:ext cx="3773713" cy="1807220"/>
           </a:xfrm>
           <a:prstGeom prst="rect">
             <a:avLst/>
           </a:prstGeom>
         </p:spPr>
       </p:pic>
+      <p:sp>
+        <p:nvSpPr>
+          <p:cNvPr id="23" name="Text Placeholder 29"/>
+          <p:cNvSpPr>
+            <a:spLocks noGrp="1"/>
+          </p:cNvSpPr>
+          <p:nvPr>
+            <p:ph type="body" sz="quarter" idx="20"/>
+          </p:nvPr>
+        </p:nvSpPr>
+        <p:spPr>
+          <a:xfrm>
+            <a:off x="4207208" y="3646355"/>
+            <a:ext cx="3773714" cy="222250"/>
+          </a:xfrm>
+          <a:solidFill>
+            <a:schemeClr val="accent5"/>
+          </a:solidFill>
+        </p:spPr>
+        <p:txBody>
+          <a:bodyPr>
+            <a:normAutofit/>
+          </a:bodyPr>
+          <a:lstStyle/>
+          <a:p>
+            <a:r>
+              <a:rPr lang="en-US" sz="1200" dirty="0" smtClean="0">
+                <a:latin typeface="Times New Roman" panose="02020603050405020304" pitchFamily="18" charset="0"/>
+                <a:cs typeface="Times New Roman" panose="02020603050405020304" pitchFamily="18" charset="0"/>
+              </a:rPr>
+              <a:t>Data Pre-Processing and Model Generation</a:t>
+            </a:r>
+            <a:endParaRPr lang="en-US" sz="1200" dirty="0">
+              <a:latin typeface="Times New Roman" panose="02020603050405020304" pitchFamily="18" charset="0"/>
+              <a:cs typeface="Times New Roman" panose="02020603050405020304" pitchFamily="18" charset="0"/>
+            </a:endParaRPr>
+          </a:p>
+        </p:txBody>
+      </p:sp>
+      <p:pic>
+        <p:nvPicPr>
+          <p:cNvPr id="6" name="Picture 5"/>
+          <p:cNvPicPr>
+            <a:picLocks noChangeAspect="1"/>
+          </p:cNvPicPr>
+          <p:nvPr/>
+        </p:nvPicPr>
+        <p:blipFill>
+          <a:blip r:embed="rId8"/>
+          <a:stretch>
+            <a:fillRect/>
+          </a:stretch>
+        </p:blipFill>
+        <p:spPr>
+          <a:xfrm>
+            <a:off x="193524" y="5141221"/>
+            <a:ext cx="3773714" cy="1651466"/>
+          </a:xfrm>
+          <a:prstGeom prst="rect">
+            <a:avLst/>
+          </a:prstGeom>
+        </p:spPr>
+      </p:pic>
+      <p:sp>
+        <p:nvSpPr>
+          <p:cNvPr id="29" name="Text Placeholder 21"/>
+          <p:cNvSpPr>
+            <a:spLocks noGrp="1"/>
+          </p:cNvSpPr>
+          <p:nvPr>
+            <p:ph type="body" sz="quarter" idx="12"/>
+          </p:nvPr>
+        </p:nvSpPr>
+        <p:spPr>
+          <a:xfrm>
+            <a:off x="193524" y="4918971"/>
+            <a:ext cx="3773714" cy="222250"/>
+          </a:xfrm>
+          <a:solidFill>
+            <a:schemeClr val="accent5"/>
+          </a:solidFill>
+        </p:spPr>
+        <p:txBody>
+          <a:bodyPr>
+            <a:normAutofit/>
+          </a:bodyPr>
+          <a:lstStyle/>
+          <a:p>
+            <a:r>
+              <a:rPr lang="en-US" sz="1200" dirty="0" smtClean="0">
+                <a:latin typeface="Times New Roman" panose="02020603050405020304" pitchFamily="18" charset="0"/>
+                <a:cs typeface="Times New Roman" panose="02020603050405020304" pitchFamily="18" charset="0"/>
+              </a:rPr>
+              <a:t>Working of CNN Model</a:t>
+            </a:r>
+            <a:endParaRPr lang="en-US" sz="1200" dirty="0">
+              <a:latin typeface="Times New Roman" panose="02020603050405020304" pitchFamily="18" charset="0"/>
+              <a:cs typeface="Times New Roman" panose="02020603050405020304" pitchFamily="18" charset="0"/>
+            </a:endParaRPr>
+          </a:p>
+        </p:txBody>
+      </p:sp>
     </p:spTree>
     <p:extLst>
       <p:ext uri="{BB962C8B-B14F-4D97-AF65-F5344CB8AC3E}">

</xml_diff>